<commit_message>
Second commit, testing github
</commit_message>
<xml_diff>
--- a/Thesis-Zoghi.pptx
+++ b/Thesis-Zoghi.pptx
@@ -461,6 +461,95 @@
     </a:lvl9pPr>
   </p:notesStyle>
 </p:notesMaster>
+</file>
+
+<file path=ppt/notesSlides/notesSlide1.xml><?xml version="1.0" encoding="utf-8"?>
+<p:notes xmlns:a="http://schemas.openxmlformats.org/drawingml/2006/main" xmlns:r="http://schemas.openxmlformats.org/officeDocument/2006/relationships" xmlns:p="http://schemas.openxmlformats.org/presentationml/2006/main">
+  <p:cSld>
+    <p:spTree>
+      <p:nvGrpSpPr>
+        <p:cNvPr id="1" name=""/>
+        <p:cNvGrpSpPr/>
+        <p:nvPr/>
+      </p:nvGrpSpPr>
+      <p:grpSpPr>
+        <a:xfrm>
+          <a:off x="0" y="0"/>
+          <a:ext cx="0" cy="0"/>
+          <a:chOff x="0" y="0"/>
+          <a:chExt cx="0" cy="0"/>
+        </a:xfrm>
+      </p:grpSpPr>
+      <p:sp>
+        <p:nvSpPr>
+          <p:cNvPr id="2" name="Slide Image Placeholder 1"/>
+          <p:cNvSpPr>
+            <a:spLocks noGrp="1" noRot="1" noChangeAspect="1"/>
+          </p:cNvSpPr>
+          <p:nvPr>
+            <p:ph type="sldImg"/>
+          </p:nvPr>
+        </p:nvSpPr>
+        <p:spPr/>
+      </p:sp>
+      <p:sp>
+        <p:nvSpPr>
+          <p:cNvPr id="3" name="Notes Placeholder 2"/>
+          <p:cNvSpPr>
+            <a:spLocks noGrp="1"/>
+          </p:cNvSpPr>
+          <p:nvPr>
+            <p:ph type="body" idx="1"/>
+          </p:nvPr>
+        </p:nvSpPr>
+        <p:spPr/>
+        <p:txBody>
+          <a:bodyPr/>
+          <a:lstStyle/>
+          <a:p>
+            <a:pPr algn="r" rtl="1"/>
+            <a:r>
+              <a:rPr lang="fa-IR" smtClean="0"/>
+              <a:t>انشعاب و الحاق هم می گویند.</a:t>
+            </a:r>
+            <a:endParaRPr lang="en-US"/>
+          </a:p>
+        </p:txBody>
+      </p:sp>
+      <p:sp>
+        <p:nvSpPr>
+          <p:cNvPr id="4" name="Slide Number Placeholder 3"/>
+          <p:cNvSpPr>
+            <a:spLocks noGrp="1"/>
+          </p:cNvSpPr>
+          <p:nvPr>
+            <p:ph type="sldNum" sz="quarter" idx="10"/>
+          </p:nvPr>
+        </p:nvSpPr>
+        <p:spPr/>
+        <p:txBody>
+          <a:bodyPr/>
+          <a:lstStyle/>
+          <a:p>
+            <a:fld id="{71C3505F-4D36-4457-A284-FC5A0E4C256A}" type="slidenum">
+              <a:rPr lang="en-US" smtClean="0"/>
+              <a:t>4</a:t>
+            </a:fld>
+            <a:endParaRPr lang="en-US"/>
+          </a:p>
+        </p:txBody>
+      </p:sp>
+    </p:spTree>
+    <p:extLst>
+      <p:ext uri="{BB962C8B-B14F-4D97-AF65-F5344CB8AC3E}">
+        <p14:creationId xmlns:p14="http://schemas.microsoft.com/office/powerpoint/2010/main" val="3514283514"/>
+      </p:ext>
+    </p:extLst>
+  </p:cSld>
+  <p:clrMapOvr>
+    <a:masterClrMapping/>
+  </p:clrMapOvr>
+</p:notes>
 </file>
 
 <file path=ppt/slideLayouts/slideLayout1.xml><?xml version="1.0" encoding="utf-8"?>
@@ -4061,7 +4150,7 @@
           </p:nvPr>
         </p:nvPicPr>
         <p:blipFill>
-          <a:blip r:embed="rId2">
+          <a:blip r:embed="rId3">
             <a:extLst>
               <a:ext uri="{28A0092B-C50C-407E-A947-70E740481C1C}">
                 <a14:useLocalDpi xmlns:a14="http://schemas.microsoft.com/office/drawing/2010/main" val="0"/>
@@ -4111,11 +4200,11 @@
           <p:nvPr/>
         </p:nvPicPr>
         <p:blipFill>
-          <a:blip r:embed="rId3">
+          <a:blip r:embed="rId4">
             <a:extLst>
               <a:ext uri="{BEBA8EAE-BF5A-486C-A8C5-ECC9F3942E4B}">
                 <a14:imgProps xmlns:a14="http://schemas.microsoft.com/office/drawing/2010/main">
-                  <a14:imgLayer r:embed="rId4">
+                  <a14:imgLayer r:embed="rId5">
                     <a14:imgEffect>
                       <a14:brightnessContrast bright="20000"/>
                     </a14:imgEffect>

</xml_diff>